<commit_message>
add Demo plan (1,2,3,4,5) for presentation
</commit_message>
<xml_diff>
--- a/documents/Presentation.pptx
+++ b/documents/Presentation.pptx
@@ -5,7 +5,7 @@
     <p:sldMasterId id="2147483648" r:id="rId1"/>
   </p:sldMasterIdLst>
   <p:notesMasterIdLst>
-    <p:notesMasterId r:id="rId13"/>
+    <p:notesMasterId r:id="rId20"/>
   </p:notesMasterIdLst>
   <p:sldIdLst>
     <p:sldId id="256" r:id="rId2"/>
@@ -19,6 +19,13 @@
     <p:sldId id="262" r:id="rId10"/>
     <p:sldId id="263" r:id="rId11"/>
     <p:sldId id="264" r:id="rId12"/>
+    <p:sldId id="267" r:id="rId13"/>
+    <p:sldId id="268" r:id="rId14"/>
+    <p:sldId id="269" r:id="rId15"/>
+    <p:sldId id="270" r:id="rId16"/>
+    <p:sldId id="271" r:id="rId17"/>
+    <p:sldId id="272" r:id="rId18"/>
+    <p:sldId id="273" r:id="rId19"/>
   </p:sldIdLst>
   <p:sldSz cx="12192000" cy="6858000"/>
   <p:notesSz cx="6858000" cy="9144000"/>
@@ -207,7 +214,7 @@
           <a:p>
             <a:fld id="{31868129-A059-084A-81AC-1C2D421669D6}" type="datetimeFigureOut">
               <a:rPr lang="en-US" smtClean="0"/>
-              <a:t>4/27/17</a:t>
+              <a:t>4/29/17</a:t>
             </a:fld>
             <a:endParaRPr lang="en-US"/>
           </a:p>
@@ -687,465 +694,6 @@
           <a:bodyPr/>
           <a:lstStyle/>
           <a:p>
-            <a:r>
-              <a:rPr lang="en-US" sz="1200" kern="1200" dirty="0" smtClean="0">
-                <a:solidFill>
-                  <a:schemeClr val="tx1"/>
-                </a:solidFill>
-                <a:effectLst/>
-                <a:latin typeface="+mn-lt"/>
-                <a:ea typeface="+mn-ea"/>
-                <a:cs typeface="+mn-cs"/>
-              </a:rPr>
-              <a:t>As a user, I want to login/logout the system</a:t>
-            </a:r>
-          </a:p>
-          <a:p>
-            <a:r>
-              <a:rPr lang="en-US" sz="1200" kern="1200" dirty="0" smtClean="0">
-                <a:solidFill>
-                  <a:schemeClr val="tx1"/>
-                </a:solidFill>
-                <a:effectLst/>
-                <a:latin typeface="+mn-lt"/>
-                <a:ea typeface="+mn-ea"/>
-                <a:cs typeface="+mn-cs"/>
-              </a:rPr>
-              <a:t>As </a:t>
-            </a:r>
-            <a:r>
-              <a:rPr lang="en-US" sz="1200" kern="1200" dirty="0" smtClean="0">
-                <a:solidFill>
-                  <a:schemeClr val="tx1"/>
-                </a:solidFill>
-                <a:effectLst/>
-                <a:latin typeface="+mn-lt"/>
-                <a:ea typeface="+mn-ea"/>
-                <a:cs typeface="+mn-cs"/>
-              </a:rPr>
-              <a:t>a user, I want to access website online</a:t>
-            </a:r>
-          </a:p>
-          <a:p>
-            <a:r>
-              <a:rPr lang="en-US" sz="1200" kern="1200" dirty="0" smtClean="0">
-                <a:solidFill>
-                  <a:schemeClr val="tx1"/>
-                </a:solidFill>
-                <a:effectLst/>
-                <a:latin typeface="+mn-lt"/>
-                <a:ea typeface="+mn-ea"/>
-                <a:cs typeface="+mn-cs"/>
-              </a:rPr>
-              <a:t> </a:t>
-            </a:r>
-          </a:p>
-          <a:p>
-            <a:r>
-              <a:rPr lang="en-US" sz="1200" kern="1200" dirty="0" smtClean="0">
-                <a:solidFill>
-                  <a:schemeClr val="tx1"/>
-                </a:solidFill>
-                <a:effectLst/>
-                <a:latin typeface="+mn-lt"/>
-                <a:ea typeface="+mn-ea"/>
-                <a:cs typeface="+mn-cs"/>
-              </a:rPr>
-              <a:t>As an administrator, I want to add more situation options (sick, injury, etc.)</a:t>
-            </a:r>
-          </a:p>
-          <a:p>
-            <a:r>
-              <a:rPr lang="en-US" sz="1200" kern="1200" dirty="0" smtClean="0">
-                <a:solidFill>
-                  <a:schemeClr val="tx1"/>
-                </a:solidFill>
-                <a:effectLst/>
-                <a:latin typeface="+mn-lt"/>
-                <a:ea typeface="+mn-ea"/>
-                <a:cs typeface="+mn-cs"/>
-              </a:rPr>
-              <a:t>As an administrator, I can view all claims in the system for each years</a:t>
-            </a:r>
-          </a:p>
-          <a:p>
-            <a:r>
-              <a:rPr lang="en-US" sz="1200" kern="1200" dirty="0" smtClean="0">
-                <a:solidFill>
-                  <a:schemeClr val="tx1"/>
-                </a:solidFill>
-                <a:effectLst/>
-                <a:latin typeface="+mn-lt"/>
-                <a:ea typeface="+mn-ea"/>
-                <a:cs typeface="+mn-cs"/>
-              </a:rPr>
-              <a:t>As an administrator, I want to view items of assessment</a:t>
-            </a:r>
-          </a:p>
-          <a:p>
-            <a:r>
-              <a:rPr lang="en-US" sz="1200" kern="1200" dirty="0" smtClean="0">
-                <a:solidFill>
-                  <a:schemeClr val="tx1"/>
-                </a:solidFill>
-                <a:effectLst/>
-                <a:latin typeface="+mn-lt"/>
-                <a:ea typeface="+mn-ea"/>
-                <a:cs typeface="+mn-cs"/>
-              </a:rPr>
-              <a:t>As an administrator, I want to set up closure date of claim</a:t>
-            </a:r>
-          </a:p>
-          <a:p>
-            <a:r>
-              <a:rPr lang="en-US" sz="1200" kern="1200" dirty="0" smtClean="0">
-                <a:solidFill>
-                  <a:schemeClr val="tx1"/>
-                </a:solidFill>
-                <a:effectLst/>
-                <a:latin typeface="+mn-lt"/>
-                <a:ea typeface="+mn-ea"/>
-                <a:cs typeface="+mn-cs"/>
-              </a:rPr>
-              <a:t>As an administrator, I want to manage account of Users</a:t>
-            </a:r>
-          </a:p>
-          <a:p>
-            <a:r>
-              <a:rPr lang="en-US" sz="1200" kern="1200" dirty="0" smtClean="0">
-                <a:solidFill>
-                  <a:schemeClr val="tx1"/>
-                </a:solidFill>
-                <a:effectLst/>
-                <a:latin typeface="+mn-lt"/>
-                <a:ea typeface="+mn-ea"/>
-                <a:cs typeface="+mn-cs"/>
-              </a:rPr>
-              <a:t>As an administrator, I want to manage system data</a:t>
-            </a:r>
-          </a:p>
-          <a:p>
-            <a:r>
-              <a:rPr lang="en-US" sz="1200" kern="1200" dirty="0" smtClean="0">
-                <a:solidFill>
-                  <a:schemeClr val="tx1"/>
-                </a:solidFill>
-                <a:effectLst/>
-                <a:latin typeface="+mn-lt"/>
-                <a:ea typeface="+mn-ea"/>
-                <a:cs typeface="+mn-cs"/>
-              </a:rPr>
-              <a:t> </a:t>
-            </a:r>
-          </a:p>
-          <a:p>
-            <a:r>
-              <a:rPr lang="en-US" sz="1200" kern="1200" dirty="0" smtClean="0">
-                <a:solidFill>
-                  <a:schemeClr val="tx1"/>
-                </a:solidFill>
-                <a:effectLst/>
-                <a:latin typeface="+mn-lt"/>
-                <a:ea typeface="+mn-ea"/>
-                <a:cs typeface="+mn-cs"/>
-              </a:rPr>
-              <a:t>As an EC manager, I want to see all claims</a:t>
-            </a:r>
-          </a:p>
-          <a:p>
-            <a:r>
-              <a:rPr lang="en-US" sz="1200" kern="1200" dirty="0" smtClean="0">
-                <a:solidFill>
-                  <a:schemeClr val="tx1"/>
-                </a:solidFill>
-                <a:effectLst/>
-                <a:latin typeface="+mn-lt"/>
-                <a:ea typeface="+mn-ea"/>
-                <a:cs typeface="+mn-cs"/>
-              </a:rPr>
-              <a:t>As an EC Manager, I want to see claim Statistical Analysis (</a:t>
-            </a:r>
-            <a:r>
-              <a:rPr lang="en-US" sz="1200" kern="1200" dirty="0" err="1" smtClean="0">
-                <a:solidFill>
-                  <a:schemeClr val="tx1"/>
-                </a:solidFill>
-                <a:effectLst/>
-                <a:latin typeface="+mn-lt"/>
-                <a:ea typeface="+mn-ea"/>
-                <a:cs typeface="+mn-cs"/>
-              </a:rPr>
-              <a:t>e.g</a:t>
-            </a:r>
-            <a:r>
-              <a:rPr lang="en-US" sz="1200" kern="1200" dirty="0" smtClean="0">
-                <a:solidFill>
-                  <a:schemeClr val="tx1"/>
-                </a:solidFill>
-                <a:effectLst/>
-                <a:latin typeface="+mn-lt"/>
-                <a:ea typeface="+mn-ea"/>
-                <a:cs typeface="+mn-cs"/>
-              </a:rPr>
-              <a:t>: Number of claims per year per Faculty...)</a:t>
-            </a:r>
-          </a:p>
-          <a:p>
-            <a:r>
-              <a:rPr lang="en-US" sz="1200" kern="1200" dirty="0" smtClean="0">
-                <a:solidFill>
-                  <a:schemeClr val="tx1"/>
-                </a:solidFill>
-                <a:effectLst/>
-                <a:latin typeface="+mn-lt"/>
-                <a:ea typeface="+mn-ea"/>
-                <a:cs typeface="+mn-cs"/>
-              </a:rPr>
-              <a:t>As admin or manager, I want to see weekly report or customize the report details</a:t>
-            </a:r>
-          </a:p>
-          <a:p>
-            <a:r>
-              <a:rPr lang="en-US" sz="1200" kern="1200" dirty="0" smtClean="0">
-                <a:solidFill>
-                  <a:schemeClr val="tx1"/>
-                </a:solidFill>
-                <a:effectLst/>
-                <a:latin typeface="+mn-lt"/>
-                <a:ea typeface="+mn-ea"/>
-                <a:cs typeface="+mn-cs"/>
-              </a:rPr>
-              <a:t> </a:t>
-            </a:r>
-          </a:p>
-          <a:p>
-            <a:r>
-              <a:rPr lang="en-US" sz="1200" kern="1200" dirty="0" smtClean="0">
-                <a:solidFill>
-                  <a:schemeClr val="tx1"/>
-                </a:solidFill>
-                <a:effectLst/>
-                <a:latin typeface="+mn-lt"/>
-                <a:ea typeface="+mn-ea"/>
-                <a:cs typeface="+mn-cs"/>
-              </a:rPr>
-              <a:t>As an EC Coordinator, I want to receive email of notification when new claim is submitted</a:t>
-            </a:r>
-          </a:p>
-          <a:p>
-            <a:r>
-              <a:rPr lang="en-US" sz="1200" kern="1200" dirty="0" smtClean="0">
-                <a:solidFill>
-                  <a:schemeClr val="tx1"/>
-                </a:solidFill>
-                <a:effectLst/>
-                <a:latin typeface="+mn-lt"/>
-                <a:ea typeface="+mn-ea"/>
-                <a:cs typeface="+mn-cs"/>
-              </a:rPr>
-              <a:t>As an EC Coordinator, </a:t>
-            </a:r>
-            <a:r>
-              <a:rPr lang="en-US" sz="1200" kern="1200" dirty="0" smtClean="0">
-                <a:solidFill>
-                  <a:schemeClr val="tx1"/>
-                </a:solidFill>
-                <a:effectLst/>
-                <a:latin typeface="+mn-lt"/>
-                <a:ea typeface="+mn-ea"/>
-                <a:cs typeface="+mn-cs"/>
-              </a:rPr>
-              <a:t>I </a:t>
-            </a:r>
-            <a:r>
-              <a:rPr lang="en-US" sz="1200" kern="1200" dirty="0" smtClean="0">
-                <a:solidFill>
-                  <a:schemeClr val="tx1"/>
-                </a:solidFill>
-                <a:effectLst/>
-                <a:latin typeface="+mn-lt"/>
-                <a:ea typeface="+mn-ea"/>
-                <a:cs typeface="+mn-cs"/>
-              </a:rPr>
-              <a:t>want to process new claim</a:t>
-            </a:r>
-          </a:p>
-          <a:p>
-            <a:r>
-              <a:rPr lang="en-US" sz="1200" kern="1200" dirty="0" smtClean="0">
-                <a:solidFill>
-                  <a:schemeClr val="tx1"/>
-                </a:solidFill>
-                <a:effectLst/>
-                <a:latin typeface="+mn-lt"/>
-                <a:ea typeface="+mn-ea"/>
-                <a:cs typeface="+mn-cs"/>
-              </a:rPr>
-              <a:t>As an EC Coordinator, I want to see all the process of my Faculty</a:t>
-            </a:r>
-          </a:p>
-          <a:p>
-            <a:r>
-              <a:rPr lang="en-US" sz="1200" kern="1200" dirty="0" smtClean="0">
-                <a:solidFill>
-                  <a:schemeClr val="tx1"/>
-                </a:solidFill>
-                <a:effectLst/>
-                <a:latin typeface="+mn-lt"/>
-                <a:ea typeface="+mn-ea"/>
-                <a:cs typeface="+mn-cs"/>
-              </a:rPr>
-              <a:t> </a:t>
-            </a:r>
-          </a:p>
-          <a:p>
-            <a:r>
-              <a:rPr lang="en-US" sz="1200" kern="1200" dirty="0" smtClean="0">
-                <a:solidFill>
-                  <a:schemeClr val="tx1"/>
-                </a:solidFill>
-                <a:effectLst/>
-                <a:latin typeface="+mn-lt"/>
-                <a:ea typeface="+mn-ea"/>
-                <a:cs typeface="+mn-cs"/>
-              </a:rPr>
-              <a:t>As a Student, I want to submit more than 1 EC claims for my items of assessment. The claim must be </a:t>
-            </a:r>
-            <a:r>
-              <a:rPr lang="en-US" sz="1200" kern="1200" dirty="0" err="1" smtClean="0">
-                <a:solidFill>
-                  <a:schemeClr val="tx1"/>
-                </a:solidFill>
-                <a:effectLst/>
-                <a:latin typeface="+mn-lt"/>
-                <a:ea typeface="+mn-ea"/>
-                <a:cs typeface="+mn-cs"/>
-              </a:rPr>
-              <a:t>submited</a:t>
-            </a:r>
-            <a:r>
-              <a:rPr lang="en-US" sz="1200" kern="1200" dirty="0" smtClean="0">
-                <a:solidFill>
-                  <a:schemeClr val="tx1"/>
-                </a:solidFill>
-                <a:effectLst/>
-                <a:latin typeface="+mn-lt"/>
-                <a:ea typeface="+mn-ea"/>
-                <a:cs typeface="+mn-cs"/>
-              </a:rPr>
-              <a:t> before closure. date. And the claim must belong the faculties' student</a:t>
-            </a:r>
-          </a:p>
-          <a:p>
-            <a:r>
-              <a:rPr lang="en-US" sz="1200" kern="1200" dirty="0" smtClean="0">
-                <a:solidFill>
-                  <a:schemeClr val="tx1"/>
-                </a:solidFill>
-                <a:effectLst/>
-                <a:latin typeface="+mn-lt"/>
-                <a:ea typeface="+mn-ea"/>
-                <a:cs typeface="+mn-cs"/>
-              </a:rPr>
-              <a:t>As a Student, I want to submit evidences for my EC claims (</a:t>
-            </a:r>
-            <a:r>
-              <a:rPr lang="en-US" sz="1200" kern="1200" dirty="0" err="1" smtClean="0">
-                <a:solidFill>
-                  <a:schemeClr val="tx1"/>
-                </a:solidFill>
-                <a:effectLst/>
-                <a:latin typeface="+mn-lt"/>
-                <a:ea typeface="+mn-ea"/>
-                <a:cs typeface="+mn-cs"/>
-              </a:rPr>
-              <a:t>e.g</a:t>
-            </a:r>
-            <a:r>
-              <a:rPr lang="en-US" sz="1200" kern="1200" dirty="0" smtClean="0">
-                <a:solidFill>
-                  <a:schemeClr val="tx1"/>
-                </a:solidFill>
-                <a:effectLst/>
-                <a:latin typeface="+mn-lt"/>
-                <a:ea typeface="+mn-ea"/>
-                <a:cs typeface="+mn-cs"/>
-              </a:rPr>
-              <a:t>: Images, PDFs…) before final closure date</a:t>
-            </a:r>
-          </a:p>
-          <a:p>
-            <a:r>
-              <a:rPr lang="en-US" sz="1200" kern="1200" dirty="0" smtClean="0">
-                <a:solidFill>
-                  <a:schemeClr val="tx1"/>
-                </a:solidFill>
-                <a:effectLst/>
-                <a:latin typeface="+mn-lt"/>
-                <a:ea typeface="+mn-ea"/>
-                <a:cs typeface="+mn-cs"/>
-              </a:rPr>
-              <a:t>As a Student, I want to receive email which containing the decision of my EC claim</a:t>
-            </a:r>
-          </a:p>
-          <a:p>
-            <a:r>
-              <a:rPr lang="en-US" sz="1200" kern="1200" dirty="0" smtClean="0">
-                <a:solidFill>
-                  <a:schemeClr val="tx1"/>
-                </a:solidFill>
-                <a:effectLst/>
-                <a:latin typeface="+mn-lt"/>
-                <a:ea typeface="+mn-ea"/>
-                <a:cs typeface="+mn-cs"/>
-              </a:rPr>
-              <a:t>As a Student, I want to see all my claims which is submitted also the </a:t>
-            </a:r>
-            <a:r>
-              <a:rPr lang="en-US" sz="1200" kern="1200" dirty="0" smtClean="0">
-                <a:solidFill>
-                  <a:schemeClr val="tx1"/>
-                </a:solidFill>
-                <a:effectLst/>
-                <a:latin typeface="+mn-lt"/>
-                <a:ea typeface="+mn-ea"/>
-                <a:cs typeface="+mn-cs"/>
-              </a:rPr>
-              <a:t>decisions</a:t>
-            </a:r>
-          </a:p>
-          <a:p>
-            <a:pPr marL="0" marR="0" indent="0" algn="l" defTabSz="914400" rtl="0" eaLnBrk="1" fontAlgn="auto" latinLnBrk="0" hangingPunct="1">
-              <a:lnSpc>
-                <a:spcPct val="100000"/>
-              </a:lnSpc>
-              <a:spcBef>
-                <a:spcPts val="0"/>
-              </a:spcBef>
-              <a:spcAft>
-                <a:spcPts val="0"/>
-              </a:spcAft>
-              <a:buClrTx/>
-              <a:buSzTx/>
-              <a:buFontTx/>
-              <a:buNone/>
-              <a:tabLst/>
-              <a:defRPr/>
-            </a:pPr>
-            <a:r>
-              <a:rPr lang="en-US" sz="1200" kern="1200" dirty="0" smtClean="0">
-                <a:solidFill>
-                  <a:schemeClr val="tx1"/>
-                </a:solidFill>
-                <a:effectLst/>
-                <a:latin typeface="+mn-lt"/>
-                <a:ea typeface="+mn-ea"/>
-                <a:cs typeface="+mn-cs"/>
-              </a:rPr>
-              <a:t>As a student, I want to searching and sorting claim</a:t>
-            </a:r>
-          </a:p>
-          <a:p>
             <a:endParaRPr lang="en-US" sz="1200" kern="1200" dirty="0">
               <a:solidFill>
                 <a:schemeClr val="tx1"/>
@@ -1420,7 +968,7 @@
           <a:p>
             <a:fld id="{4BDF68E2-58F2-4D09-BE8B-E3BD06533059}" type="datetimeFigureOut">
               <a:rPr lang="en-US" dirty="0"/>
-              <a:t>4/27/17</a:t>
+              <a:t>4/29/17</a:t>
             </a:fld>
             <a:endParaRPr lang="en-US" dirty="0"/>
           </a:p>
@@ -1623,7 +1171,7 @@
           <a:p>
             <a:fld id="{2E2D6473-DF6D-4702-B328-E0DD40540A4E}" type="datetimeFigureOut">
               <a:rPr lang="en-US" dirty="0"/>
-              <a:t>4/27/17</a:t>
+              <a:t>4/29/17</a:t>
             </a:fld>
             <a:endParaRPr lang="en-US" dirty="0"/>
           </a:p>
@@ -1874,7 +1422,7 @@
           <a:p>
             <a:fld id="{E26F7E3A-B166-407D-9866-32884E7D5B37}" type="datetimeFigureOut">
               <a:rPr lang="en-US" dirty="0"/>
-              <a:t>4/27/17</a:t>
+              <a:t>4/29/17</a:t>
             </a:fld>
             <a:endParaRPr lang="en-US" dirty="0"/>
           </a:p>
@@ -2043,7 +1591,7 @@
           <a:p>
             <a:fld id="{528FC5F6-F338-4AE4-BB23-26385BCFC423}" type="datetimeFigureOut">
               <a:rPr lang="en-US" dirty="0"/>
-              <a:t>4/27/17</a:t>
+              <a:t>4/29/17</a:t>
             </a:fld>
             <a:endParaRPr lang="en-US" dirty="0"/>
           </a:p>
@@ -2381,7 +1929,7 @@
           <a:p>
             <a:fld id="{20EBB0C4-6273-4C6E-B9BD-2EDC30F1CD52}" type="datetimeFigureOut">
               <a:rPr lang="en-US" dirty="0"/>
-              <a:t>4/27/17</a:t>
+              <a:t>4/29/17</a:t>
             </a:fld>
             <a:endParaRPr lang="en-US" dirty="0"/>
           </a:p>
@@ -2651,7 +2199,7 @@
           <a:p>
             <a:fld id="{19AB4D41-86C1-4908-B66A-0B50CEB3BF29}" type="datetimeFigureOut">
               <a:rPr lang="en-US" dirty="0"/>
-              <a:t>4/27/17</a:t>
+              <a:t>4/29/17</a:t>
             </a:fld>
             <a:endParaRPr lang="en-US" dirty="0"/>
           </a:p>
@@ -3025,7 +2573,7 @@
           <a:p>
             <a:fld id="{E6426E2C-56C1-4E0D-A793-0088A7FDD37E}" type="datetimeFigureOut">
               <a:rPr lang="en-US" dirty="0"/>
-              <a:t>4/27/17</a:t>
+              <a:t>4/29/17</a:t>
             </a:fld>
             <a:endParaRPr lang="en-US" dirty="0"/>
           </a:p>
@@ -3138,7 +2686,7 @@
           <a:p>
             <a:fld id="{C8C39B41-D8B5-4052-B551-9B5525EAA8B6}" type="datetimeFigureOut">
               <a:rPr lang="en-US" dirty="0"/>
-              <a:t>4/27/17</a:t>
+              <a:t>4/29/17</a:t>
             </a:fld>
             <a:endParaRPr lang="en-US" dirty="0"/>
           </a:p>
@@ -3304,7 +2852,7 @@
           <a:p>
             <a:fld id="{4D94136C-8742-45B2-AF27-D93DF72833A9}" type="datetimeFigureOut">
               <a:rPr lang="en-US" dirty="0"/>
-              <a:t>4/27/17</a:t>
+              <a:t>4/29/17</a:t>
             </a:fld>
             <a:endParaRPr lang="en-US" dirty="0"/>
           </a:p>
@@ -3654,7 +3202,7 @@
           <a:p>
             <a:fld id="{32ABBEA6-7C60-4B02-AE87-00D78D8422AF}" type="datetimeFigureOut">
               <a:rPr lang="en-US" dirty="0"/>
-              <a:t>4/27/17</a:t>
+              <a:t>4/29/17</a:t>
             </a:fld>
             <a:endParaRPr lang="en-US" dirty="0"/>
           </a:p>
@@ -4032,7 +3580,7 @@
           <a:p>
             <a:fld id="{C9CAD897-D46E-4AD2-BD9B-49DD3E640873}" type="datetimeFigureOut">
               <a:rPr lang="en-US" dirty="0"/>
-              <a:t>4/27/17</a:t>
+              <a:t>4/29/17</a:t>
             </a:fld>
             <a:endParaRPr lang="en-US" dirty="0"/>
           </a:p>
@@ -4314,7 +3862,7 @@
           <a:p>
             <a:fld id="{98624D31-43A5-475A-80CF-332C9F6DCF35}" type="datetimeFigureOut">
               <a:rPr lang="en-US" dirty="0"/>
-              <a:t>4/27/17</a:t>
+              <a:t>4/29/17</a:t>
             </a:fld>
             <a:endParaRPr lang="en-US" dirty="0"/>
           </a:p>
@@ -4935,7 +4483,7 @@
             <a:pPr algn="ctr"/>
             <a:r>
               <a:rPr lang="en-US" b="1" dirty="0" smtClean="0"/>
-              <a:t>DEMO</a:t>
+              <a:t>Demo Plan</a:t>
             </a:r>
             <a:endParaRPr lang="en-US" b="1" dirty="0"/>
           </a:p>
@@ -4956,46 +4504,60 @@
           <a:bodyPr/>
           <a:lstStyle/>
           <a:p>
-            <a:r>
-              <a:rPr lang="en-US" dirty="0" smtClean="0"/>
-              <a:t>- </a:t>
-            </a:r>
-            <a:r>
-              <a:rPr lang="en-US" dirty="0" smtClean="0"/>
-              <a:t>each function</a:t>
-            </a:r>
-            <a:endParaRPr lang="en-US" dirty="0" smtClean="0"/>
-          </a:p>
-          <a:p>
-            <a:pPr lvl="1"/>
-            <a:r>
-              <a:rPr lang="en-US" dirty="0" smtClean="0"/>
-              <a:t>description</a:t>
-            </a:r>
-            <a:endParaRPr lang="en-US" dirty="0" smtClean="0"/>
-          </a:p>
-          <a:p>
-            <a:pPr lvl="1"/>
-            <a:r>
-              <a:rPr lang="en-US" dirty="0" smtClean="0"/>
-              <a:t>screenshots</a:t>
-            </a:r>
-            <a:endParaRPr lang="en-US" dirty="0" smtClean="0"/>
-          </a:p>
-          <a:p>
-            <a:pPr lvl="1"/>
-            <a:r>
-              <a:rPr lang="en-US" dirty="0" smtClean="0"/>
-              <a:t>code</a:t>
-            </a:r>
-            <a:endParaRPr lang="en-US" dirty="0" smtClean="0"/>
-          </a:p>
-          <a:p>
-            <a:pPr lvl="1"/>
-            <a:endParaRPr lang="en-US" dirty="0" smtClean="0"/>
-          </a:p>
-          <a:p>
-            <a:pPr lvl="1"/>
+            <a:pPr>
+              <a:buFont typeface="Wingdings" charset="2"/>
+              <a:buChar char="Ø"/>
+            </a:pPr>
+            <a:r>
+              <a:rPr lang="en-US" sz="2800" dirty="0" smtClean="0"/>
+              <a:t>Demo all system features</a:t>
+            </a:r>
+          </a:p>
+          <a:p>
+            <a:pPr>
+              <a:buFont typeface="Wingdings" charset="2"/>
+              <a:buChar char="Ø"/>
+            </a:pPr>
+            <a:r>
+              <a:rPr lang="en-US" sz="2800" dirty="0" smtClean="0"/>
+              <a:t>Demo data validation</a:t>
+            </a:r>
+          </a:p>
+          <a:p>
+            <a:pPr>
+              <a:buFont typeface="Wingdings" charset="2"/>
+              <a:buChar char="Ø"/>
+            </a:pPr>
+            <a:r>
+              <a:rPr lang="en-US" sz="2800" dirty="0" smtClean="0"/>
+              <a:t>Demo date-time relations</a:t>
+            </a:r>
+          </a:p>
+          <a:p>
+            <a:pPr>
+              <a:buFont typeface="Wingdings" charset="2"/>
+              <a:buChar char="Ø"/>
+            </a:pPr>
+            <a:r>
+              <a:rPr lang="en-US" sz="2800" dirty="0" smtClean="0"/>
+              <a:t>Demo authorization (different roles or authorities)</a:t>
+            </a:r>
+          </a:p>
+          <a:p>
+            <a:pPr>
+              <a:buFont typeface="Wingdings" charset="2"/>
+              <a:buChar char="Ø"/>
+            </a:pPr>
+            <a:r>
+              <a:rPr lang="en-US" sz="2800" dirty="0" smtClean="0"/>
+              <a:t>Demo all system reports</a:t>
+            </a:r>
+          </a:p>
+          <a:p>
+            <a:pPr>
+              <a:buFont typeface="Wingdings" charset="2"/>
+              <a:buChar char="Ø"/>
+            </a:pPr>
             <a:endParaRPr lang="en-US" dirty="0" smtClean="0"/>
           </a:p>
         </p:txBody>
@@ -5045,6 +4607,14 @@
           <a:bodyPr/>
           <a:lstStyle/>
           <a:p>
+            <a:r>
+              <a:rPr lang="en-US" dirty="0" smtClean="0"/>
+              <a:t>Demo 1: a</a:t>
+            </a:r>
+            <a:r>
+              <a:rPr lang="en-US" dirty="0" smtClean="0"/>
+              <a:t>ll system features</a:t>
+            </a:r>
             <a:endParaRPr lang="en-US" dirty="0"/>
           </a:p>
         </p:txBody>
@@ -5066,6 +4636,77 @@
           </a:bodyPr>
           <a:lstStyle/>
           <a:p>
+            <a:pPr>
+              <a:buFont typeface="Wingdings" charset="2"/>
+              <a:buChar char="Ø"/>
+            </a:pPr>
+            <a:r>
+              <a:rPr lang="en-US" sz="2800" dirty="0" smtClean="0"/>
+              <a:t>Authentication (login, logout)</a:t>
+            </a:r>
+          </a:p>
+          <a:p>
+            <a:pPr>
+              <a:buFont typeface="Wingdings" charset="2"/>
+              <a:buChar char="Ø"/>
+            </a:pPr>
+            <a:r>
+              <a:rPr lang="en-US" sz="2800" dirty="0" smtClean="0"/>
+              <a:t>Student submits claims</a:t>
+            </a:r>
+          </a:p>
+          <a:p>
+            <a:pPr>
+              <a:buFont typeface="Wingdings" charset="2"/>
+              <a:buChar char="Ø"/>
+            </a:pPr>
+            <a:r>
+              <a:rPr lang="en-US" sz="2800" dirty="0" smtClean="0"/>
+              <a:t>Student submits evidences</a:t>
+            </a:r>
+          </a:p>
+          <a:p>
+            <a:pPr>
+              <a:buFont typeface="Wingdings" charset="2"/>
+              <a:buChar char="Ø"/>
+            </a:pPr>
+            <a:r>
+              <a:rPr lang="en-US" sz="2800" dirty="0" smtClean="0"/>
+              <a:t>Student receive email which contains the decision of claim</a:t>
+            </a:r>
+          </a:p>
+          <a:p>
+            <a:pPr>
+              <a:buFont typeface="Wingdings" charset="2"/>
+              <a:buChar char="Ø"/>
+            </a:pPr>
+            <a:r>
+              <a:rPr lang="en-US" sz="2800" dirty="0" smtClean="0"/>
+              <a:t>Student views all submitted claims</a:t>
+            </a:r>
+          </a:p>
+          <a:p>
+            <a:pPr>
+              <a:buFont typeface="Wingdings" charset="2"/>
+              <a:buChar char="Ø"/>
+            </a:pPr>
+            <a:r>
+              <a:rPr lang="en-US" sz="2800" dirty="0" smtClean="0"/>
+              <a:t>Student searches and sorts claims</a:t>
+            </a:r>
+          </a:p>
+          <a:p>
+            <a:pPr>
+              <a:buFont typeface="Wingdings" charset="2"/>
+              <a:buChar char="Ø"/>
+            </a:pPr>
+            <a:endParaRPr lang="en-US" dirty="0" smtClean="0"/>
+          </a:p>
+          <a:p>
+            <a:pPr>
+              <a:buFont typeface="Wingdings" charset="2"/>
+              <a:buChar char="Ø"/>
+            </a:pPr>
             <a:endParaRPr lang="en-US" dirty="0"/>
           </a:p>
         </p:txBody>
@@ -5080,6 +4721,1141 @@
   <p:clrMapOvr>
     <a:masterClrMapping/>
   </p:clrMapOvr>
+</p:sld>
+</file>
+
+<file path=ppt/slides/slide12.xml><?xml version="1.0" encoding="utf-8"?>
+<p:sld xmlns:a="http://schemas.openxmlformats.org/drawingml/2006/main" xmlns:r="http://schemas.openxmlformats.org/officeDocument/2006/relationships" xmlns:p="http://schemas.openxmlformats.org/presentationml/2006/main">
+  <p:cSld>
+    <p:spTree>
+      <p:nvGrpSpPr>
+        <p:cNvPr id="1" name=""/>
+        <p:cNvGrpSpPr/>
+        <p:nvPr/>
+      </p:nvGrpSpPr>
+      <p:grpSpPr>
+        <a:xfrm>
+          <a:off x="0" y="0"/>
+          <a:ext cx="0" cy="0"/>
+          <a:chOff x="0" y="0"/>
+          <a:chExt cx="0" cy="0"/>
+        </a:xfrm>
+      </p:grpSpPr>
+      <p:sp>
+        <p:nvSpPr>
+          <p:cNvPr id="2" name="Title 1"/>
+          <p:cNvSpPr>
+            <a:spLocks noGrp="1"/>
+          </p:cNvSpPr>
+          <p:nvPr>
+            <p:ph type="title"/>
+          </p:nvPr>
+        </p:nvSpPr>
+        <p:spPr/>
+        <p:txBody>
+          <a:bodyPr/>
+          <a:lstStyle/>
+          <a:p>
+            <a:r>
+              <a:rPr lang="en-US" dirty="0" smtClean="0"/>
+              <a:t>Demo 1: </a:t>
+            </a:r>
+            <a:r>
+              <a:rPr lang="en-US" dirty="0"/>
+              <a:t>all system </a:t>
+            </a:r>
+            <a:r>
+              <a:rPr lang="en-US" dirty="0" smtClean="0"/>
+              <a:t>features (cont.)</a:t>
+            </a:r>
+            <a:endParaRPr lang="en-US" dirty="0"/>
+          </a:p>
+        </p:txBody>
+      </p:sp>
+      <p:sp>
+        <p:nvSpPr>
+          <p:cNvPr id="3" name="Content Placeholder 2"/>
+          <p:cNvSpPr>
+            <a:spLocks noGrp="1"/>
+          </p:cNvSpPr>
+          <p:nvPr>
+            <p:ph idx="1"/>
+          </p:nvPr>
+        </p:nvSpPr>
+        <p:spPr/>
+        <p:txBody>
+          <a:bodyPr>
+            <a:normAutofit fontScale="92500"/>
+          </a:bodyPr>
+          <a:lstStyle/>
+          <a:p>
+            <a:pPr>
+              <a:buFont typeface="Wingdings" charset="2"/>
+              <a:buChar char="Ø"/>
+            </a:pPr>
+            <a:r>
+              <a:rPr lang="en-US" sz="2800" dirty="0" smtClean="0">
+                <a:solidFill>
+                  <a:schemeClr val="tx1"/>
+                </a:solidFill>
+              </a:rPr>
+              <a:t>Coordinator receives </a:t>
+            </a:r>
+            <a:r>
+              <a:rPr lang="en-US" sz="2800" dirty="0">
+                <a:solidFill>
+                  <a:schemeClr val="tx1"/>
+                </a:solidFill>
+              </a:rPr>
+              <a:t>email of notification when new claim is submitted</a:t>
+            </a:r>
+          </a:p>
+          <a:p>
+            <a:pPr>
+              <a:buFont typeface="Wingdings" charset="2"/>
+              <a:buChar char="Ø"/>
+            </a:pPr>
+            <a:r>
+              <a:rPr lang="en-US" sz="2800" dirty="0" smtClean="0">
+                <a:solidFill>
+                  <a:schemeClr val="tx1"/>
+                </a:solidFill>
+              </a:rPr>
+              <a:t>Coordinator processes </a:t>
+            </a:r>
+            <a:r>
+              <a:rPr lang="en-US" sz="2800" dirty="0">
+                <a:solidFill>
+                  <a:schemeClr val="tx1"/>
+                </a:solidFill>
+              </a:rPr>
+              <a:t>new claim</a:t>
+            </a:r>
+          </a:p>
+          <a:p>
+            <a:pPr>
+              <a:buFont typeface="Wingdings" charset="2"/>
+              <a:buChar char="Ø"/>
+            </a:pPr>
+            <a:r>
+              <a:rPr lang="en-US" sz="2800" dirty="0" smtClean="0">
+                <a:solidFill>
+                  <a:schemeClr val="tx1"/>
+                </a:solidFill>
+              </a:rPr>
+              <a:t>Coordinator views all </a:t>
+            </a:r>
+            <a:r>
+              <a:rPr lang="en-US" sz="2800" dirty="0">
+                <a:solidFill>
+                  <a:schemeClr val="tx1"/>
+                </a:solidFill>
+              </a:rPr>
+              <a:t>the process of my </a:t>
+            </a:r>
+            <a:r>
+              <a:rPr lang="en-US" sz="2800" dirty="0" smtClean="0">
+                <a:solidFill>
+                  <a:schemeClr val="tx1"/>
+                </a:solidFill>
+              </a:rPr>
+              <a:t>Faculty</a:t>
+            </a:r>
+          </a:p>
+          <a:p>
+            <a:pPr>
+              <a:buFont typeface="Wingdings" charset="2"/>
+              <a:buChar char="Ø"/>
+            </a:pPr>
+            <a:endParaRPr lang="en-US" sz="2800" dirty="0" smtClean="0">
+              <a:solidFill>
+                <a:schemeClr val="tx1"/>
+              </a:solidFill>
+            </a:endParaRPr>
+          </a:p>
+          <a:p>
+            <a:pPr>
+              <a:buFont typeface="Wingdings" charset="2"/>
+              <a:buChar char="Ø"/>
+            </a:pPr>
+            <a:r>
+              <a:rPr lang="en-US" sz="2800" dirty="0">
+                <a:solidFill>
+                  <a:schemeClr val="tx1"/>
+                </a:solidFill>
+              </a:rPr>
+              <a:t>Manager views all </a:t>
+            </a:r>
+            <a:r>
+              <a:rPr lang="en-US" sz="2800" dirty="0" smtClean="0">
+                <a:solidFill>
+                  <a:schemeClr val="tx1"/>
+                </a:solidFill>
+              </a:rPr>
+              <a:t>claims</a:t>
+            </a:r>
+          </a:p>
+          <a:p>
+            <a:pPr>
+              <a:buFont typeface="Wingdings" charset="2"/>
+              <a:buChar char="Ø"/>
+            </a:pPr>
+            <a:r>
+              <a:rPr lang="en-US" sz="2800" dirty="0">
+                <a:solidFill>
+                  <a:schemeClr val="tx1"/>
+                </a:solidFill>
+              </a:rPr>
+              <a:t>Manager view claim reports (statistics</a:t>
+            </a:r>
+            <a:r>
+              <a:rPr lang="en-US" sz="2800" dirty="0" smtClean="0">
+                <a:solidFill>
+                  <a:schemeClr val="tx1"/>
+                </a:solidFill>
+              </a:rPr>
+              <a:t>)</a:t>
+            </a:r>
+          </a:p>
+          <a:p>
+            <a:pPr marL="91440" lvl="1" indent="-91440">
+              <a:spcBef>
+                <a:spcPts val="1200"/>
+              </a:spcBef>
+              <a:spcAft>
+                <a:spcPts val="200"/>
+              </a:spcAft>
+              <a:buSzPct val="100000"/>
+              <a:buFont typeface="Wingdings" charset="2"/>
+              <a:buChar char="Ø"/>
+            </a:pPr>
+            <a:r>
+              <a:rPr lang="en-US" sz="2800" dirty="0" smtClean="0">
+                <a:solidFill>
+                  <a:schemeClr val="tx1"/>
+                </a:solidFill>
+              </a:rPr>
+              <a:t>Admin </a:t>
+            </a:r>
+            <a:r>
+              <a:rPr lang="en-US" sz="2800" dirty="0">
+                <a:solidFill>
+                  <a:schemeClr val="tx1"/>
+                </a:solidFill>
+              </a:rPr>
+              <a:t>or </a:t>
+            </a:r>
+            <a:r>
+              <a:rPr lang="en-US" sz="2800" dirty="0" smtClean="0">
+                <a:solidFill>
+                  <a:schemeClr val="tx1"/>
+                </a:solidFill>
+              </a:rPr>
+              <a:t>manager views weekly </a:t>
+            </a:r>
+            <a:r>
+              <a:rPr lang="en-US" sz="2800" dirty="0">
+                <a:solidFill>
+                  <a:schemeClr val="tx1"/>
+                </a:solidFill>
+              </a:rPr>
+              <a:t>report or customize the report details</a:t>
+            </a:r>
+          </a:p>
+          <a:p>
+            <a:endParaRPr lang="en-US" dirty="0"/>
+          </a:p>
+        </p:txBody>
+      </p:sp>
+    </p:spTree>
+    <p:extLst>
+      <p:ext uri="{BB962C8B-B14F-4D97-AF65-F5344CB8AC3E}">
+        <p14:creationId xmlns:p14="http://schemas.microsoft.com/office/powerpoint/2010/main" val="562138506"/>
+      </p:ext>
+    </p:extLst>
+  </p:cSld>
+  <p:clrMapOvr>
+    <a:masterClrMapping/>
+  </p:clrMapOvr>
+</p:sld>
+</file>
+
+<file path=ppt/slides/slide13.xml><?xml version="1.0" encoding="utf-8"?>
+<p:sld xmlns:a="http://schemas.openxmlformats.org/drawingml/2006/main" xmlns:r="http://schemas.openxmlformats.org/officeDocument/2006/relationships" xmlns:p="http://schemas.openxmlformats.org/presentationml/2006/main">
+  <p:cSld>
+    <p:spTree>
+      <p:nvGrpSpPr>
+        <p:cNvPr id="1" name=""/>
+        <p:cNvGrpSpPr/>
+        <p:nvPr/>
+      </p:nvGrpSpPr>
+      <p:grpSpPr>
+        <a:xfrm>
+          <a:off x="0" y="0"/>
+          <a:ext cx="0" cy="0"/>
+          <a:chOff x="0" y="0"/>
+          <a:chExt cx="0" cy="0"/>
+        </a:xfrm>
+      </p:grpSpPr>
+      <p:sp>
+        <p:nvSpPr>
+          <p:cNvPr id="2" name="Title 1"/>
+          <p:cNvSpPr>
+            <a:spLocks noGrp="1"/>
+          </p:cNvSpPr>
+          <p:nvPr>
+            <p:ph type="title"/>
+          </p:nvPr>
+        </p:nvSpPr>
+        <p:spPr/>
+        <p:txBody>
+          <a:bodyPr/>
+          <a:lstStyle/>
+          <a:p>
+            <a:r>
+              <a:rPr lang="en-US" dirty="0" smtClean="0"/>
+              <a:t>Demo 1: </a:t>
+            </a:r>
+            <a:r>
+              <a:rPr lang="en-US" dirty="0"/>
+              <a:t>all system features (cont.)</a:t>
+            </a:r>
+          </a:p>
+        </p:txBody>
+      </p:sp>
+      <p:sp>
+        <p:nvSpPr>
+          <p:cNvPr id="3" name="Content Placeholder 2"/>
+          <p:cNvSpPr>
+            <a:spLocks noGrp="1"/>
+          </p:cNvSpPr>
+          <p:nvPr>
+            <p:ph idx="1"/>
+          </p:nvPr>
+        </p:nvSpPr>
+        <p:spPr/>
+        <p:txBody>
+          <a:bodyPr>
+            <a:normAutofit lnSpcReduction="10000"/>
+          </a:bodyPr>
+          <a:lstStyle/>
+          <a:p>
+            <a:pPr marL="0" indent="-292608">
+              <a:buFont typeface="Wingdings" charset="2"/>
+              <a:buChar char="Ø"/>
+            </a:pPr>
+            <a:r>
+              <a:rPr lang="en-US" sz="2600" dirty="0" smtClean="0">
+                <a:solidFill>
+                  <a:schemeClr val="tx1"/>
+                </a:solidFill>
+              </a:rPr>
+              <a:t>Admin </a:t>
+            </a:r>
+            <a:r>
+              <a:rPr lang="en-US" sz="2600" dirty="0">
+                <a:solidFill>
+                  <a:schemeClr val="tx1"/>
+                </a:solidFill>
+              </a:rPr>
+              <a:t>manages account of Users</a:t>
+            </a:r>
+          </a:p>
+          <a:p>
+            <a:pPr>
+              <a:buFont typeface="Wingdings" charset="2"/>
+              <a:buChar char="Ø"/>
+            </a:pPr>
+            <a:r>
+              <a:rPr lang="en-US" sz="2600" dirty="0">
+                <a:solidFill>
+                  <a:schemeClr val="tx1"/>
+                </a:solidFill>
+              </a:rPr>
+              <a:t>Admin manages system data</a:t>
+            </a:r>
+          </a:p>
+          <a:p>
+            <a:pPr>
+              <a:buFont typeface="Wingdings" charset="2"/>
+              <a:buChar char="Ø"/>
+            </a:pPr>
+            <a:r>
+              <a:rPr lang="en-US" sz="2600" dirty="0">
+                <a:solidFill>
+                  <a:schemeClr val="tx1"/>
+                </a:solidFill>
+              </a:rPr>
+              <a:t>Admin adds more situation options (sick, injury, etc.) as circumstances</a:t>
+            </a:r>
+          </a:p>
+          <a:p>
+            <a:pPr>
+              <a:buFont typeface="Wingdings" charset="2"/>
+              <a:buChar char="Ø"/>
+            </a:pPr>
+            <a:r>
+              <a:rPr lang="en-US" sz="2600" dirty="0">
+                <a:solidFill>
+                  <a:schemeClr val="tx1"/>
+                </a:solidFill>
+              </a:rPr>
+              <a:t>Admin views all claims in the system for each years</a:t>
+            </a:r>
+          </a:p>
+          <a:p>
+            <a:pPr>
+              <a:buFont typeface="Wingdings" charset="2"/>
+              <a:buChar char="Ø"/>
+            </a:pPr>
+            <a:r>
+              <a:rPr lang="en-US" sz="2600" dirty="0">
+                <a:solidFill>
+                  <a:schemeClr val="tx1"/>
+                </a:solidFill>
+              </a:rPr>
+              <a:t>Admin views items of assessment</a:t>
+            </a:r>
+          </a:p>
+          <a:p>
+            <a:pPr>
+              <a:buFont typeface="Wingdings" charset="2"/>
+              <a:buChar char="Ø"/>
+            </a:pPr>
+            <a:r>
+              <a:rPr lang="en-US" sz="2600" dirty="0">
+                <a:solidFill>
+                  <a:schemeClr val="tx1"/>
+                </a:solidFill>
+              </a:rPr>
+              <a:t>Admin sets up closure date of </a:t>
+            </a:r>
+            <a:r>
+              <a:rPr lang="en-US" sz="2600" dirty="0" smtClean="0">
+                <a:solidFill>
+                  <a:schemeClr val="tx1"/>
+                </a:solidFill>
+              </a:rPr>
+              <a:t>claims</a:t>
+            </a:r>
+            <a:endParaRPr lang="en-US" sz="2600" dirty="0">
+              <a:solidFill>
+                <a:schemeClr val="tx1"/>
+              </a:solidFill>
+            </a:endParaRPr>
+          </a:p>
+          <a:p>
+            <a:pPr>
+              <a:buFont typeface="Wingdings" charset="2"/>
+              <a:buChar char="Ø"/>
+            </a:pPr>
+            <a:r>
+              <a:rPr lang="en-US" sz="2600" dirty="0">
+                <a:solidFill>
+                  <a:schemeClr val="tx1"/>
+                </a:solidFill>
+              </a:rPr>
+              <a:t>Admin sets up closure date of </a:t>
+            </a:r>
+            <a:r>
+              <a:rPr lang="en-US" sz="2600" dirty="0" smtClean="0">
+                <a:solidFill>
+                  <a:schemeClr val="tx1"/>
+                </a:solidFill>
+              </a:rPr>
+              <a:t>items</a:t>
+            </a:r>
+          </a:p>
+          <a:p>
+            <a:pPr>
+              <a:buFont typeface="Wingdings" charset="2"/>
+              <a:buChar char="Ø"/>
+            </a:pPr>
+            <a:r>
+              <a:rPr lang="en-US" sz="2600" dirty="0" smtClean="0">
+                <a:solidFill>
+                  <a:schemeClr val="tx1"/>
+                </a:solidFill>
+              </a:rPr>
+              <a:t>User accesses website online</a:t>
+            </a:r>
+            <a:endParaRPr lang="en-US" sz="2600" dirty="0">
+              <a:solidFill>
+                <a:schemeClr val="tx1"/>
+              </a:solidFill>
+            </a:endParaRPr>
+          </a:p>
+          <a:p>
+            <a:pPr>
+              <a:buFont typeface="Wingdings" charset="2"/>
+              <a:buChar char="Ø"/>
+            </a:pPr>
+            <a:endParaRPr lang="en-US" dirty="0" smtClean="0"/>
+          </a:p>
+          <a:p>
+            <a:pPr>
+              <a:buFont typeface="Wingdings" charset="2"/>
+              <a:buChar char="Ø"/>
+            </a:pPr>
+            <a:endParaRPr lang="en-US" dirty="0"/>
+          </a:p>
+        </p:txBody>
+      </p:sp>
+    </p:spTree>
+    <p:extLst>
+      <p:ext uri="{BB962C8B-B14F-4D97-AF65-F5344CB8AC3E}">
+        <p14:creationId xmlns:p14="http://schemas.microsoft.com/office/powerpoint/2010/main" val="1963626366"/>
+      </p:ext>
+    </p:extLst>
+  </p:cSld>
+  <p:clrMapOvr>
+    <a:masterClrMapping/>
+  </p:clrMapOvr>
+</p:sld>
+</file>
+
+<file path=ppt/slides/slide14.xml><?xml version="1.0" encoding="utf-8"?>
+<p:sld xmlns:a="http://schemas.openxmlformats.org/drawingml/2006/main" xmlns:r="http://schemas.openxmlformats.org/officeDocument/2006/relationships" xmlns:p="http://schemas.openxmlformats.org/presentationml/2006/main">
+  <p:cSld>
+    <p:spTree>
+      <p:nvGrpSpPr>
+        <p:cNvPr id="1" name=""/>
+        <p:cNvGrpSpPr/>
+        <p:nvPr/>
+      </p:nvGrpSpPr>
+      <p:grpSpPr>
+        <a:xfrm>
+          <a:off x="0" y="0"/>
+          <a:ext cx="0" cy="0"/>
+          <a:chOff x="0" y="0"/>
+          <a:chExt cx="0" cy="0"/>
+        </a:xfrm>
+      </p:grpSpPr>
+      <p:sp>
+        <p:nvSpPr>
+          <p:cNvPr id="2" name="Title 1"/>
+          <p:cNvSpPr>
+            <a:spLocks noGrp="1"/>
+          </p:cNvSpPr>
+          <p:nvPr>
+            <p:ph type="title"/>
+          </p:nvPr>
+        </p:nvSpPr>
+        <p:spPr/>
+        <p:txBody>
+          <a:bodyPr/>
+          <a:lstStyle/>
+          <a:p>
+            <a:r>
+              <a:rPr lang="en-US" dirty="0" smtClean="0"/>
+              <a:t>Demo 2: data validation (form)</a:t>
+            </a:r>
+            <a:endParaRPr lang="en-US" dirty="0"/>
+          </a:p>
+        </p:txBody>
+      </p:sp>
+      <p:sp>
+        <p:nvSpPr>
+          <p:cNvPr id="3" name="Content Placeholder 2"/>
+          <p:cNvSpPr>
+            <a:spLocks noGrp="1"/>
+          </p:cNvSpPr>
+          <p:nvPr>
+            <p:ph idx="1"/>
+          </p:nvPr>
+        </p:nvSpPr>
+        <p:spPr/>
+        <p:txBody>
+          <a:bodyPr/>
+          <a:lstStyle/>
+          <a:p>
+            <a:pPr>
+              <a:buFont typeface="Wingdings" charset="2"/>
+              <a:buChar char="Ø"/>
+            </a:pPr>
+            <a:r>
+              <a:rPr lang="en-US" sz="3000" dirty="0"/>
+              <a:t>Text </a:t>
+            </a:r>
+            <a:r>
+              <a:rPr lang="en-US" sz="3000" dirty="0" smtClean="0"/>
+              <a:t>validation (title, content, name, username, code</a:t>
+            </a:r>
+            <a:r>
+              <a:rPr lang="mr-IN" sz="3000" dirty="0" smtClean="0"/>
+              <a:t>…</a:t>
+            </a:r>
+            <a:r>
+              <a:rPr lang="en-US" sz="3000" dirty="0" smtClean="0"/>
+              <a:t>)</a:t>
+            </a:r>
+            <a:endParaRPr lang="en-US" sz="3000" dirty="0"/>
+          </a:p>
+          <a:p>
+            <a:pPr>
+              <a:buFont typeface="Wingdings" charset="2"/>
+              <a:buChar char="Ø"/>
+            </a:pPr>
+            <a:r>
+              <a:rPr lang="en-US" sz="3000" dirty="0"/>
+              <a:t>Date </a:t>
+            </a:r>
+            <a:r>
+              <a:rPr lang="en-US" sz="3000" dirty="0" smtClean="0"/>
+              <a:t>validation (closure date)</a:t>
+            </a:r>
+          </a:p>
+          <a:p>
+            <a:pPr>
+              <a:buFont typeface="Wingdings" charset="2"/>
+              <a:buChar char="Ø"/>
+            </a:pPr>
+            <a:r>
+              <a:rPr lang="en-US" sz="3000" dirty="0" smtClean="0"/>
+              <a:t>File validation (upload file)</a:t>
+            </a:r>
+            <a:endParaRPr lang="en-US" sz="3000" dirty="0"/>
+          </a:p>
+        </p:txBody>
+      </p:sp>
+    </p:spTree>
+    <p:extLst>
+      <p:ext uri="{BB962C8B-B14F-4D97-AF65-F5344CB8AC3E}">
+        <p14:creationId xmlns:p14="http://schemas.microsoft.com/office/powerpoint/2010/main" val="756852199"/>
+      </p:ext>
+    </p:extLst>
+  </p:cSld>
+  <p:clrMapOvr>
+    <a:masterClrMapping/>
+  </p:clrMapOvr>
+</p:sld>
+</file>
+
+<file path=ppt/slides/slide15.xml><?xml version="1.0" encoding="utf-8"?>
+<p:sld xmlns:a="http://schemas.openxmlformats.org/drawingml/2006/main" xmlns:r="http://schemas.openxmlformats.org/officeDocument/2006/relationships" xmlns:p="http://schemas.openxmlformats.org/presentationml/2006/main">
+  <p:cSld>
+    <p:spTree>
+      <p:nvGrpSpPr>
+        <p:cNvPr id="1" name=""/>
+        <p:cNvGrpSpPr/>
+        <p:nvPr/>
+      </p:nvGrpSpPr>
+      <p:grpSpPr>
+        <a:xfrm>
+          <a:off x="0" y="0"/>
+          <a:ext cx="0" cy="0"/>
+          <a:chOff x="0" y="0"/>
+          <a:chExt cx="0" cy="0"/>
+        </a:xfrm>
+      </p:grpSpPr>
+      <p:sp>
+        <p:nvSpPr>
+          <p:cNvPr id="2" name="Title 1"/>
+          <p:cNvSpPr>
+            <a:spLocks noGrp="1"/>
+          </p:cNvSpPr>
+          <p:nvPr>
+            <p:ph type="title"/>
+          </p:nvPr>
+        </p:nvSpPr>
+        <p:spPr/>
+        <p:txBody>
+          <a:bodyPr/>
+          <a:lstStyle/>
+          <a:p>
+            <a:r>
+              <a:rPr lang="en-US" dirty="0" smtClean="0"/>
+              <a:t>Demo 3: date-time relations </a:t>
+            </a:r>
+            <a:endParaRPr lang="en-US" dirty="0"/>
+          </a:p>
+        </p:txBody>
+      </p:sp>
+      <p:sp>
+        <p:nvSpPr>
+          <p:cNvPr id="3" name="Content Placeholder 2"/>
+          <p:cNvSpPr>
+            <a:spLocks noGrp="1"/>
+          </p:cNvSpPr>
+          <p:nvPr>
+            <p:ph idx="1"/>
+          </p:nvPr>
+        </p:nvSpPr>
+        <p:spPr/>
+        <p:txBody>
+          <a:bodyPr/>
+          <a:lstStyle/>
+          <a:p>
+            <a:pPr>
+              <a:buFont typeface="Wingdings" charset="2"/>
+              <a:buChar char="Ø"/>
+            </a:pPr>
+            <a:r>
+              <a:rPr lang="en-US" sz="2800" dirty="0" smtClean="0"/>
+              <a:t>Date of claim submissions</a:t>
+            </a:r>
+          </a:p>
+          <a:p>
+            <a:pPr>
+              <a:buFont typeface="Wingdings" charset="2"/>
+              <a:buChar char="Ø"/>
+            </a:pPr>
+            <a:r>
+              <a:rPr lang="en-US" sz="2800" dirty="0" smtClean="0"/>
+              <a:t>Date of evidence submissions</a:t>
+            </a:r>
+          </a:p>
+          <a:p>
+            <a:pPr>
+              <a:buFont typeface="Wingdings" charset="2"/>
+              <a:buChar char="Ø"/>
+            </a:pPr>
+            <a:r>
+              <a:rPr lang="en-US" sz="2800" dirty="0" smtClean="0"/>
+              <a:t>Closure date of claims</a:t>
+            </a:r>
+          </a:p>
+          <a:p>
+            <a:pPr>
+              <a:buFont typeface="Wingdings" charset="2"/>
+              <a:buChar char="Ø"/>
+            </a:pPr>
+            <a:r>
+              <a:rPr lang="en-US" sz="2800" dirty="0"/>
+              <a:t>Closure date of </a:t>
+            </a:r>
+            <a:r>
+              <a:rPr lang="en-US" sz="2800" dirty="0" smtClean="0"/>
+              <a:t>items</a:t>
+            </a:r>
+          </a:p>
+          <a:p>
+            <a:pPr>
+              <a:buFont typeface="Wingdings" charset="2"/>
+              <a:buChar char="Ø"/>
+            </a:pPr>
+            <a:r>
+              <a:rPr lang="en-US" sz="2800" dirty="0" smtClean="0"/>
+              <a:t>Processed date of claims</a:t>
+            </a:r>
+            <a:endParaRPr lang="en-US" sz="2800" dirty="0"/>
+          </a:p>
+          <a:p>
+            <a:pPr>
+              <a:buFont typeface="Wingdings" charset="2"/>
+              <a:buChar char="Ø"/>
+            </a:pPr>
+            <a:endParaRPr lang="en-US" dirty="0"/>
+          </a:p>
+        </p:txBody>
+      </p:sp>
+    </p:spTree>
+    <p:extLst>
+      <p:ext uri="{BB962C8B-B14F-4D97-AF65-F5344CB8AC3E}">
+        <p14:creationId xmlns:p14="http://schemas.microsoft.com/office/powerpoint/2010/main" val="132336000"/>
+      </p:ext>
+    </p:extLst>
+  </p:cSld>
+  <p:clrMapOvr>
+    <a:masterClrMapping/>
+  </p:clrMapOvr>
+</p:sld>
+</file>
+
+<file path=ppt/slides/slide16.xml><?xml version="1.0" encoding="utf-8"?>
+<p:sld xmlns:a="http://schemas.openxmlformats.org/drawingml/2006/main" xmlns:r="http://schemas.openxmlformats.org/officeDocument/2006/relationships" xmlns:p="http://schemas.openxmlformats.org/presentationml/2006/main">
+  <p:cSld>
+    <p:spTree>
+      <p:nvGrpSpPr>
+        <p:cNvPr id="1" name=""/>
+        <p:cNvGrpSpPr/>
+        <p:nvPr/>
+      </p:nvGrpSpPr>
+      <p:grpSpPr>
+        <a:xfrm>
+          <a:off x="0" y="0"/>
+          <a:ext cx="0" cy="0"/>
+          <a:chOff x="0" y="0"/>
+          <a:chExt cx="0" cy="0"/>
+        </a:xfrm>
+      </p:grpSpPr>
+      <p:sp>
+        <p:nvSpPr>
+          <p:cNvPr id="2" name="Title 1"/>
+          <p:cNvSpPr>
+            <a:spLocks noGrp="1"/>
+          </p:cNvSpPr>
+          <p:nvPr>
+            <p:ph type="title"/>
+          </p:nvPr>
+        </p:nvSpPr>
+        <p:spPr/>
+        <p:txBody>
+          <a:bodyPr/>
+          <a:lstStyle/>
+          <a:p>
+            <a:r>
+              <a:rPr lang="en-US" dirty="0" smtClean="0"/>
+              <a:t>Demo 4: authorization</a:t>
+            </a:r>
+            <a:endParaRPr lang="en-US" dirty="0"/>
+          </a:p>
+        </p:txBody>
+      </p:sp>
+      <p:sp>
+        <p:nvSpPr>
+          <p:cNvPr id="3" name="Content Placeholder 2"/>
+          <p:cNvSpPr>
+            <a:spLocks noGrp="1"/>
+          </p:cNvSpPr>
+          <p:nvPr>
+            <p:ph idx="1"/>
+          </p:nvPr>
+        </p:nvSpPr>
+        <p:spPr/>
+        <p:txBody>
+          <a:bodyPr/>
+          <a:lstStyle/>
+          <a:p>
+            <a:pPr>
+              <a:buFont typeface="Wingdings" charset="2"/>
+              <a:buChar char="Ø"/>
+            </a:pPr>
+            <a:r>
+              <a:rPr lang="en-US" sz="2800" dirty="0" smtClean="0"/>
+              <a:t>List all system roles or authorities</a:t>
+            </a:r>
+          </a:p>
+          <a:p>
+            <a:pPr>
+              <a:buFont typeface="Wingdings" charset="2"/>
+              <a:buChar char="Ø"/>
+            </a:pPr>
+            <a:r>
+              <a:rPr lang="en-US" sz="2800" dirty="0" smtClean="0"/>
+              <a:t>Authorized areas of each role</a:t>
+            </a:r>
+          </a:p>
+          <a:p>
+            <a:pPr>
+              <a:buFont typeface="Wingdings" charset="2"/>
+              <a:buChar char="Ø"/>
+            </a:pPr>
+            <a:r>
+              <a:rPr lang="en-US" sz="2800" dirty="0" smtClean="0"/>
+              <a:t>Reponses unauthorized messages</a:t>
+            </a:r>
+          </a:p>
+          <a:p>
+            <a:pPr>
+              <a:buFont typeface="Wingdings" charset="2"/>
+              <a:buChar char="Ø"/>
+            </a:pPr>
+            <a:r>
+              <a:rPr lang="en-US" sz="2800" dirty="0"/>
+              <a:t>Reponses </a:t>
+            </a:r>
+            <a:r>
+              <a:rPr lang="en-US" sz="2800" dirty="0" smtClean="0"/>
+              <a:t>not found messages</a:t>
+            </a:r>
+            <a:endParaRPr lang="en-US" sz="2800" dirty="0"/>
+          </a:p>
+          <a:p>
+            <a:pPr>
+              <a:buFont typeface="Wingdings" charset="2"/>
+              <a:buChar char="Ø"/>
+            </a:pPr>
+            <a:endParaRPr lang="en-US" dirty="0"/>
+          </a:p>
+        </p:txBody>
+      </p:sp>
+    </p:spTree>
+    <p:extLst>
+      <p:ext uri="{BB962C8B-B14F-4D97-AF65-F5344CB8AC3E}">
+        <p14:creationId xmlns:p14="http://schemas.microsoft.com/office/powerpoint/2010/main" val="1495225163"/>
+      </p:ext>
+    </p:extLst>
+  </p:cSld>
+  <p:clrMapOvr>
+    <a:masterClrMapping/>
+  </p:clrMapOvr>
+</p:sld>
+</file>
+
+<file path=ppt/slides/slide17.xml><?xml version="1.0" encoding="utf-8"?>
+<p:sld xmlns:a="http://schemas.openxmlformats.org/drawingml/2006/main" xmlns:r="http://schemas.openxmlformats.org/officeDocument/2006/relationships" xmlns:p="http://schemas.openxmlformats.org/presentationml/2006/main">
+  <p:cSld>
+    <p:spTree>
+      <p:nvGrpSpPr>
+        <p:cNvPr id="1" name=""/>
+        <p:cNvGrpSpPr/>
+        <p:nvPr/>
+      </p:nvGrpSpPr>
+      <p:grpSpPr>
+        <a:xfrm>
+          <a:off x="0" y="0"/>
+          <a:ext cx="0" cy="0"/>
+          <a:chOff x="0" y="0"/>
+          <a:chExt cx="0" cy="0"/>
+        </a:xfrm>
+      </p:grpSpPr>
+      <p:sp>
+        <p:nvSpPr>
+          <p:cNvPr id="2" name="Title 1"/>
+          <p:cNvSpPr>
+            <a:spLocks noGrp="1"/>
+          </p:cNvSpPr>
+          <p:nvPr>
+            <p:ph type="title"/>
+          </p:nvPr>
+        </p:nvSpPr>
+        <p:spPr/>
+        <p:txBody>
+          <a:bodyPr/>
+          <a:lstStyle/>
+          <a:p>
+            <a:r>
+              <a:rPr lang="en-US" dirty="0" smtClean="0"/>
+              <a:t>Demo 5: system reports </a:t>
+            </a:r>
+            <a:endParaRPr lang="en-US" dirty="0"/>
+          </a:p>
+        </p:txBody>
+      </p:sp>
+      <p:sp>
+        <p:nvSpPr>
+          <p:cNvPr id="3" name="Content Placeholder 2"/>
+          <p:cNvSpPr>
+            <a:spLocks noGrp="1"/>
+          </p:cNvSpPr>
+          <p:nvPr>
+            <p:ph idx="1"/>
+          </p:nvPr>
+        </p:nvSpPr>
+        <p:spPr/>
+        <p:txBody>
+          <a:bodyPr>
+            <a:normAutofit/>
+          </a:bodyPr>
+          <a:lstStyle/>
+          <a:p>
+            <a:pPr>
+              <a:buFont typeface="Wingdings" charset="2"/>
+              <a:buChar char="Ø"/>
+            </a:pPr>
+            <a:r>
+              <a:rPr lang="en-US" sz="2800" dirty="0" smtClean="0"/>
+              <a:t>Claims per year</a:t>
+            </a:r>
+          </a:p>
+          <a:p>
+            <a:pPr>
+              <a:buFont typeface="Wingdings" charset="2"/>
+              <a:buChar char="Ø"/>
+            </a:pPr>
+            <a:r>
+              <a:rPr lang="en-US" sz="2800" dirty="0" smtClean="0"/>
+              <a:t>Claims per faculty</a:t>
+            </a:r>
+          </a:p>
+          <a:p>
+            <a:pPr>
+              <a:buFont typeface="Wingdings" charset="2"/>
+              <a:buChar char="Ø"/>
+            </a:pPr>
+            <a:r>
+              <a:rPr lang="en-US" sz="2800" dirty="0" smtClean="0"/>
+              <a:t>Processed claims per year</a:t>
+            </a:r>
+          </a:p>
+          <a:p>
+            <a:pPr>
+              <a:buFont typeface="Wingdings" charset="2"/>
+              <a:buChar char="Ø"/>
+            </a:pPr>
+            <a:r>
+              <a:rPr lang="en-US" sz="2800" dirty="0" smtClean="0"/>
+              <a:t>Claims per circumstance</a:t>
+            </a:r>
+          </a:p>
+          <a:p>
+            <a:pPr>
+              <a:buFont typeface="Wingdings" charset="2"/>
+              <a:buChar char="Ø"/>
+            </a:pPr>
+            <a:r>
+              <a:rPr lang="en-US" sz="2800" dirty="0" smtClean="0"/>
+              <a:t>Claims per validation</a:t>
+            </a:r>
+          </a:p>
+          <a:p>
+            <a:pPr>
+              <a:buFont typeface="Wingdings" charset="2"/>
+              <a:buChar char="Ø"/>
+            </a:pPr>
+            <a:r>
+              <a:rPr lang="en-US" sz="2800" dirty="0" smtClean="0"/>
+              <a:t>Custom claim reports</a:t>
+            </a:r>
+            <a:endParaRPr lang="en-US" sz="2800" dirty="0"/>
+          </a:p>
+        </p:txBody>
+      </p:sp>
+    </p:spTree>
+    <p:extLst>
+      <p:ext uri="{BB962C8B-B14F-4D97-AF65-F5344CB8AC3E}">
+        <p14:creationId xmlns:p14="http://schemas.microsoft.com/office/powerpoint/2010/main" val="1496077575"/>
+      </p:ext>
+    </p:extLst>
+  </p:cSld>
+  <p:clrMapOvr>
+    <a:masterClrMapping/>
+  </p:clrMapOvr>
+  <p:timing>
+    <p:tnLst>
+      <p:par>
+        <p:cTn id="1" dur="indefinite" restart="never" nodeType="tmRoot"/>
+      </p:par>
+    </p:tnLst>
+  </p:timing>
+</p:sld>
+</file>
+
+<file path=ppt/slides/slide18.xml><?xml version="1.0" encoding="utf-8"?>
+<p:sld xmlns:a="http://schemas.openxmlformats.org/drawingml/2006/main" xmlns:r="http://schemas.openxmlformats.org/officeDocument/2006/relationships" xmlns:p="http://schemas.openxmlformats.org/presentationml/2006/main">
+  <p:cSld>
+    <p:spTree>
+      <p:nvGrpSpPr>
+        <p:cNvPr id="1" name=""/>
+        <p:cNvGrpSpPr/>
+        <p:nvPr/>
+      </p:nvGrpSpPr>
+      <p:grpSpPr>
+        <a:xfrm>
+          <a:off x="0" y="0"/>
+          <a:ext cx="0" cy="0"/>
+          <a:chOff x="0" y="0"/>
+          <a:chExt cx="0" cy="0"/>
+        </a:xfrm>
+      </p:grpSpPr>
+      <p:sp>
+        <p:nvSpPr>
+          <p:cNvPr id="2" name="Title 1"/>
+          <p:cNvSpPr>
+            <a:spLocks noGrp="1"/>
+          </p:cNvSpPr>
+          <p:nvPr>
+            <p:ph type="title"/>
+          </p:nvPr>
+        </p:nvSpPr>
+        <p:spPr/>
+        <p:txBody>
+          <a:bodyPr/>
+          <a:lstStyle/>
+          <a:p>
+            <a:pPr algn="ctr"/>
+            <a:r>
+              <a:rPr lang="en-US" b="1" dirty="0" err="1" smtClean="0"/>
+              <a:t>ECManagement</a:t>
+            </a:r>
+            <a:r>
+              <a:rPr lang="en-US" b="1" dirty="0" smtClean="0"/>
+              <a:t> System</a:t>
+            </a:r>
+            <a:endParaRPr lang="en-US" b="1" dirty="0"/>
+          </a:p>
+        </p:txBody>
+      </p:sp>
+      <p:sp>
+        <p:nvSpPr>
+          <p:cNvPr id="3" name="Content Placeholder 2"/>
+          <p:cNvSpPr>
+            <a:spLocks noGrp="1"/>
+          </p:cNvSpPr>
+          <p:nvPr>
+            <p:ph idx="1"/>
+          </p:nvPr>
+        </p:nvSpPr>
+        <p:spPr/>
+        <p:txBody>
+          <a:bodyPr/>
+          <a:lstStyle/>
+          <a:p>
+            <a:pPr algn="ctr"/>
+            <a:endParaRPr lang="en-US" dirty="0" smtClean="0">
+              <a:hlinkClick r:id="rId2"/>
+            </a:endParaRPr>
+          </a:p>
+          <a:p>
+            <a:pPr algn="ctr"/>
+            <a:r>
+              <a:rPr lang="en-US" sz="2800" dirty="0" smtClean="0"/>
+              <a:t>Website: </a:t>
+            </a:r>
+            <a:r>
+              <a:rPr lang="en-US" sz="2800" dirty="0">
+                <a:hlinkClick r:id="rId2"/>
+              </a:rPr>
+              <a:t>http://ecmsystem.ga/</a:t>
+            </a:r>
+            <a:r>
+              <a:rPr lang="en-US" sz="2800" dirty="0"/>
+              <a:t> </a:t>
+            </a:r>
+          </a:p>
+          <a:p>
+            <a:pPr algn="ctr"/>
+            <a:endParaRPr lang="en-US" sz="2800" dirty="0" smtClean="0"/>
+          </a:p>
+          <a:p>
+            <a:pPr algn="ctr"/>
+            <a:r>
+              <a:rPr lang="en-US" sz="2800" dirty="0" smtClean="0"/>
+              <a:t>Screencast: </a:t>
+            </a:r>
+            <a:r>
+              <a:rPr lang="en-US" sz="2800" dirty="0">
+                <a:hlinkClick r:id="rId3"/>
+              </a:rPr>
+              <a:t>http://rebrand.ly/ewsd_g2_cw_kaka</a:t>
+            </a:r>
+            <a:r>
+              <a:rPr lang="en-US" sz="2800" dirty="0"/>
+              <a:t> </a:t>
+            </a:r>
+            <a:r>
+              <a:rPr lang="en-US" sz="2800" dirty="0"/>
+              <a:t/>
+            </a:r>
+            <a:br>
+              <a:rPr lang="en-US" sz="2800" dirty="0"/>
+            </a:br>
+            <a:endParaRPr lang="en-US" sz="2800" dirty="0"/>
+          </a:p>
+          <a:p>
+            <a:pPr algn="ctr"/>
+            <a:endParaRPr lang="en-US" sz="2800" dirty="0"/>
+          </a:p>
+        </p:txBody>
+      </p:sp>
+    </p:spTree>
+    <p:extLst>
+      <p:ext uri="{BB962C8B-B14F-4D97-AF65-F5344CB8AC3E}">
+        <p14:creationId xmlns:p14="http://schemas.microsoft.com/office/powerpoint/2010/main" val="401412654"/>
+      </p:ext>
+    </p:extLst>
+  </p:cSld>
+  <p:clrMapOvr>
+    <a:masterClrMapping/>
+  </p:clrMapOvr>
+  <p:timing>
+    <p:tnLst>
+      <p:par>
+        <p:cTn id="1" dur="indefinite" restart="never" nodeType="tmRoot"/>
+      </p:par>
+    </p:tnLst>
+  </p:timing>
 </p:sld>
 </file>
 
@@ -5119,11 +5895,7 @@
           <a:p>
             <a:r>
               <a:rPr lang="en-US" sz="6000" dirty="0" smtClean="0"/>
-              <a:t>1. </a:t>
-            </a:r>
-            <a:r>
-              <a:rPr lang="en-US" sz="6000" dirty="0" smtClean="0"/>
-              <a:t>Introduction</a:t>
+              <a:t>1. Introduction</a:t>
             </a:r>
             <a:endParaRPr lang="en-US" sz="6000" dirty="0"/>
           </a:p>
@@ -5420,11 +6192,7 @@
           <a:p>
             <a:r>
               <a:rPr lang="en-US" dirty="0" smtClean="0"/>
-              <a:t>2. </a:t>
-            </a:r>
-            <a:r>
-              <a:rPr lang="en-US" dirty="0" smtClean="0"/>
-              <a:t>Database</a:t>
+              <a:t>2. Database</a:t>
             </a:r>
             <a:endParaRPr lang="en-US" dirty="0"/>
           </a:p>
@@ -5964,9 +6732,14 @@
           <a:lstStyle/>
           <a:p>
             <a:r>
-              <a:rPr lang="en-US" dirty="0"/>
-              <a:t>Functionality (user stories)</a:t>
-            </a:r>
+              <a:rPr lang="en-US" dirty="0" smtClean="0"/>
+              <a:t>F</a:t>
+            </a:r>
+            <a:r>
+              <a:rPr lang="en-US" dirty="0" smtClean="0"/>
+              <a:t>unctionality (cont.)</a:t>
+            </a:r>
+            <a:endParaRPr lang="en-US" dirty="0"/>
           </a:p>
         </p:txBody>
       </p:sp>

</xml_diff>